<commit_message>
Edit of the PPT
</commit_message>
<xml_diff>
--- a/Compte-rendu final/Présentation projet Stealth Game Project GR n°11.pptx
+++ b/Compte-rendu final/Présentation projet Stealth Game Project GR n°11.pptx
@@ -1,6 +1,6 @@
 
 <file path=ppt/presentation.xml><?xml version="1.0" encoding="utf-8"?>
-<p:presentation xmlns:a="http://schemas.openxmlformats.org/drawingml/2006/main" xmlns:r="http://schemas.openxmlformats.org/officeDocument/2006/relationships" xmlns:p="http://schemas.openxmlformats.org/presentationml/2006/main" showSpecialPlsOnTitleSld="0" saveSubsetFonts="1">
+<p:presentation xmlns:a="http://schemas.openxmlformats.org/drawingml/2006/main" xmlns:r="http://schemas.openxmlformats.org/officeDocument/2006/relationships" xmlns:p="http://schemas.openxmlformats.org/presentationml/2006/main" saveSubsetFonts="1">
   <p:sldMasterIdLst>
     <p:sldMasterId id="2147483762" r:id="rId1"/>
   </p:sldMasterIdLst>
@@ -115,7 +115,7 @@
   </p:defaultTextStyle>
   <p:extLst>
     <p:ext uri="{EFAFB233-063F-42B5-8137-9DF3F51BA10A}">
-      <p15:sldGuideLst xmlns:p15="http://schemas.microsoft.com/office/powerpoint/2012/main" xmlns=""/>
+      <p15:sldGuideLst xmlns="" xmlns:p15="http://schemas.microsoft.com/office/powerpoint/2012/main"/>
     </p:ext>
   </p:extLst>
 </p:presentation>
@@ -657,7 +657,7 @@
           <a:bodyPr/>
           <a:lstStyle/>
           <a:p>
-            <a:fld id="{1EDBC7F5-A00D-4AE9-905A-CFFD183DD9DB}" type="datetime1">
+            <a:fld id="{B976066C-1458-4EDE-B741-53DC41DAEAA8}" type="datetime1">
               <a:rPr lang="fr-FR" smtClean="0"/>
               <a:t>10/06/2015</a:t>
             </a:fld>
@@ -857,7 +857,7 @@
           <a:bodyPr/>
           <a:lstStyle/>
           <a:p>
-            <a:fld id="{9A42C4E6-887B-489E-99DA-B77C0ACD23C0}" type="datetime1">
+            <a:fld id="{5A9800E3-CF0F-4613-877A-56E00B569F5A}" type="datetime1">
               <a:rPr lang="fr-FR" smtClean="0"/>
               <a:t>10/06/2015</a:t>
             </a:fld>
@@ -1032,7 +1032,7 @@
           <a:bodyPr/>
           <a:lstStyle/>
           <a:p>
-            <a:fld id="{EE2C2510-97C3-4143-BE71-3F949DC4CDE0}" type="datetime1">
+            <a:fld id="{501B0CE9-7855-4B9A-AD68-1570B33550BD}" type="datetime1">
               <a:rPr lang="fr-FR" smtClean="0"/>
               <a:t>10/06/2015</a:t>
             </a:fld>
@@ -1197,7 +1197,7 @@
           <a:bodyPr/>
           <a:lstStyle/>
           <a:p>
-            <a:fld id="{99BA94BE-ACCE-4275-9539-F4A141DADE42}" type="datetime1">
+            <a:fld id="{A1851B78-FB73-4200-AED3-F336F176C852}" type="datetime1">
               <a:rPr lang="fr-FR" smtClean="0"/>
               <a:t>10/06/2015</a:t>
             </a:fld>
@@ -1445,7 +1445,7 @@
           <a:bodyPr/>
           <a:lstStyle/>
           <a:p>
-            <a:fld id="{86E16C42-64EB-4662-A33E-081274A3253F}" type="datetime1">
+            <a:fld id="{7BA1045C-A5AA-4F67-A597-6C6682E2CCA1}" type="datetime1">
               <a:rPr lang="fr-FR" smtClean="0"/>
               <a:t>10/06/2015</a:t>
             </a:fld>
@@ -1763,7 +1763,7 @@
           <a:bodyPr/>
           <a:lstStyle/>
           <a:p>
-            <a:fld id="{BF37DFF2-92ED-4B62-838E-8030DE9F2746}" type="datetime1">
+            <a:fld id="{74788B6A-BEDD-46E9-AA7C-DA7B8FB50AC2}" type="datetime1">
               <a:rPr lang="fr-FR" smtClean="0"/>
               <a:t>10/06/2015</a:t>
             </a:fld>
@@ -2229,7 +2229,7 @@
           <a:bodyPr/>
           <a:lstStyle/>
           <a:p>
-            <a:fld id="{1AD1FBA2-ACD2-4A56-A401-35495FE8727C}" type="datetime1">
+            <a:fld id="{D59C078D-0C9A-4689-B992-D51C64F35F08}" type="datetime1">
               <a:rPr lang="fr-FR" smtClean="0"/>
               <a:t>10/06/2015</a:t>
             </a:fld>
@@ -2377,7 +2377,7 @@
           <a:bodyPr/>
           <a:lstStyle/>
           <a:p>
-            <a:fld id="{D49BD7F7-323E-4CA6-B35C-DBE211DCE1C4}" type="datetime1">
+            <a:fld id="{45AD7DCB-284B-4518-965D-D5EE25DD9033}" type="datetime1">
               <a:rPr lang="fr-FR" smtClean="0"/>
               <a:t>10/06/2015</a:t>
             </a:fld>
@@ -2467,7 +2467,7 @@
           <a:bodyPr/>
           <a:lstStyle/>
           <a:p>
-            <a:fld id="{B5101542-30BB-42C1-A367-D77FF4967DB9}" type="datetime1">
+            <a:fld id="{B403C34F-D9E9-48E7-8502-0F188AE1D9BE}" type="datetime1">
               <a:rPr lang="fr-FR" smtClean="0"/>
               <a:t>10/06/2015</a:t>
             </a:fld>
@@ -2741,7 +2741,7 @@
           <a:bodyPr/>
           <a:lstStyle/>
           <a:p>
-            <a:fld id="{316E2E48-3892-4939-A3F2-AA57744AB75F}" type="datetime1">
+            <a:fld id="{4A1BEA6D-6630-4C37-8D81-DA1C5055A7D2}" type="datetime1">
               <a:rPr lang="fr-FR" smtClean="0"/>
               <a:t>10/06/2015</a:t>
             </a:fld>
@@ -3046,7 +3046,7 @@
           <a:bodyPr/>
           <a:lstStyle/>
           <a:p>
-            <a:fld id="{63ED76C6-F934-486A-AA3E-5AF9ED526B0B}" type="datetime1">
+            <a:fld id="{8EFB1DBE-8E1D-4F3B-94D4-7C2C67CF613A}" type="datetime1">
               <a:rPr lang="fr-FR" smtClean="0"/>
               <a:t>10/06/2015</a:t>
             </a:fld>
@@ -3344,7 +3344,7 @@
             </a:lvl1pPr>
           </a:lstStyle>
           <a:p>
-            <a:fld id="{2223D836-2130-489B-B194-F3B836041C66}" type="datetime1">
+            <a:fld id="{2CBECA6B-511F-4203-B1DD-699DB93EAF19}" type="datetime1">
               <a:rPr lang="fr-FR" smtClean="0"/>
               <a:t>10/06/2015</a:t>
             </a:fld>
@@ -4068,6 +4068,29 @@
           </a:extLst>
         </p:spPr>
       </p:pic>
+      <p:sp>
+        <p:nvSpPr>
+          <p:cNvPr id="4" name="Espace réservé du numéro de diapositive 3"/>
+          <p:cNvSpPr>
+            <a:spLocks noGrp="1"/>
+          </p:cNvSpPr>
+          <p:nvPr>
+            <p:ph type="sldNum" sz="quarter" idx="12"/>
+          </p:nvPr>
+        </p:nvSpPr>
+        <p:spPr/>
+        <p:txBody>
+          <a:bodyPr/>
+          <a:lstStyle/>
+          <a:p>
+            <a:fld id="{63D41CEF-E43C-4E5A-84CB-CCAB0BF7804E}" type="slidenum">
+              <a:rPr lang="fr-FR" smtClean="0"/>
+              <a:t>2</a:t>
+            </a:fld>
+            <a:endParaRPr lang="fr-FR"/>
+          </a:p>
+        </p:txBody>
+      </p:sp>
     </p:spTree>
     <p:extLst>
       <p:ext uri="{BB962C8B-B14F-4D97-AF65-F5344CB8AC3E}">
@@ -4159,15 +4182,7 @@
                   <a:schemeClr val="tx1"/>
                 </a:solidFill>
               </a:rPr>
-              <a:t>Présentation </a:t>
-            </a:r>
-            <a:r>
-              <a:rPr lang="fr-FR" dirty="0" smtClean="0">
-                <a:solidFill>
-                  <a:schemeClr val="tx1"/>
-                </a:solidFill>
-              </a:rPr>
-              <a:t>projet</a:t>
+              <a:t>Présentation projet</a:t>
             </a:r>
           </a:p>
           <a:p>
@@ -4208,6 +4223,29 @@
                 <a:schemeClr val="tx1"/>
               </a:solidFill>
             </a:endParaRPr>
+          </a:p>
+        </p:txBody>
+      </p:sp>
+      <p:sp>
+        <p:nvSpPr>
+          <p:cNvPr id="4" name="Espace réservé du numéro de diapositive 3"/>
+          <p:cNvSpPr>
+            <a:spLocks noGrp="1"/>
+          </p:cNvSpPr>
+          <p:nvPr>
+            <p:ph type="sldNum" sz="quarter" idx="12"/>
+          </p:nvPr>
+        </p:nvSpPr>
+        <p:spPr/>
+        <p:txBody>
+          <a:bodyPr/>
+          <a:lstStyle/>
+          <a:p>
+            <a:fld id="{63D41CEF-E43C-4E5A-84CB-CCAB0BF7804E}" type="slidenum">
+              <a:rPr lang="fr-FR" smtClean="0"/>
+              <a:t>3</a:t>
+            </a:fld>
+            <a:endParaRPr lang="fr-FR"/>
           </a:p>
         </p:txBody>
       </p:sp>
@@ -4407,6 +4445,29 @@
           </a:extLst>
         </p:spPr>
       </p:pic>
+      <p:sp>
+        <p:nvSpPr>
+          <p:cNvPr id="3" name="Espace réservé du numéro de diapositive 2"/>
+          <p:cNvSpPr>
+            <a:spLocks noGrp="1"/>
+          </p:cNvSpPr>
+          <p:nvPr>
+            <p:ph type="sldNum" sz="quarter" idx="12"/>
+          </p:nvPr>
+        </p:nvSpPr>
+        <p:spPr/>
+        <p:txBody>
+          <a:bodyPr/>
+          <a:lstStyle/>
+          <a:p>
+            <a:fld id="{63D41CEF-E43C-4E5A-84CB-CCAB0BF7804E}" type="slidenum">
+              <a:rPr lang="fr-FR" smtClean="0"/>
+              <a:t>4</a:t>
+            </a:fld>
+            <a:endParaRPr lang="fr-FR"/>
+          </a:p>
+        </p:txBody>
+      </p:sp>
     </p:spTree>
     <p:extLst>
       <p:ext uri="{BB962C8B-B14F-4D97-AF65-F5344CB8AC3E}">
@@ -5066,6 +5127,29 @@
           </a:extLst>
         </p:spPr>
       </p:pic>
+      <p:sp>
+        <p:nvSpPr>
+          <p:cNvPr id="4" name="Espace réservé du numéro de diapositive 3"/>
+          <p:cNvSpPr>
+            <a:spLocks noGrp="1"/>
+          </p:cNvSpPr>
+          <p:nvPr>
+            <p:ph type="sldNum" sz="quarter" idx="12"/>
+          </p:nvPr>
+        </p:nvSpPr>
+        <p:spPr/>
+        <p:txBody>
+          <a:bodyPr/>
+          <a:lstStyle/>
+          <a:p>
+            <a:fld id="{63D41CEF-E43C-4E5A-84CB-CCAB0BF7804E}" type="slidenum">
+              <a:rPr lang="fr-FR" smtClean="0"/>
+              <a:t>5</a:t>
+            </a:fld>
+            <a:endParaRPr lang="fr-FR"/>
+          </a:p>
+        </p:txBody>
+      </p:sp>
     </p:spTree>
     <p:extLst>
       <p:ext uri="{BB962C8B-B14F-4D97-AF65-F5344CB8AC3E}">
@@ -5225,6 +5309,29 @@
           </a:p>
         </p:txBody>
       </p:sp>
+      <p:sp>
+        <p:nvSpPr>
+          <p:cNvPr id="4" name="Espace réservé du numéro de diapositive 3"/>
+          <p:cNvSpPr>
+            <a:spLocks noGrp="1"/>
+          </p:cNvSpPr>
+          <p:nvPr>
+            <p:ph type="sldNum" sz="quarter" idx="12"/>
+          </p:nvPr>
+        </p:nvSpPr>
+        <p:spPr/>
+        <p:txBody>
+          <a:bodyPr/>
+          <a:lstStyle/>
+          <a:p>
+            <a:fld id="{63D41CEF-E43C-4E5A-84CB-CCAB0BF7804E}" type="slidenum">
+              <a:rPr lang="fr-FR" smtClean="0"/>
+              <a:t>6</a:t>
+            </a:fld>
+            <a:endParaRPr lang="fr-FR"/>
+          </a:p>
+        </p:txBody>
+      </p:sp>
     </p:spTree>
     <p:extLst>
       <p:ext uri="{BB962C8B-B14F-4D97-AF65-F5344CB8AC3E}">
@@ -5329,6 +5436,29 @@
               <a:t>Aboutissement d’une année de travail en langage orienté objet</a:t>
             </a:r>
             <a:endParaRPr lang="fr-FR" dirty="0"/>
+          </a:p>
+        </p:txBody>
+      </p:sp>
+      <p:sp>
+        <p:nvSpPr>
+          <p:cNvPr id="4" name="Espace réservé du numéro de diapositive 3"/>
+          <p:cNvSpPr>
+            <a:spLocks noGrp="1"/>
+          </p:cNvSpPr>
+          <p:nvPr>
+            <p:ph type="sldNum" sz="quarter" idx="12"/>
+          </p:nvPr>
+        </p:nvSpPr>
+        <p:spPr/>
+        <p:txBody>
+          <a:bodyPr/>
+          <a:lstStyle/>
+          <a:p>
+            <a:fld id="{63D41CEF-E43C-4E5A-84CB-CCAB0BF7804E}" type="slidenum">
+              <a:rPr lang="fr-FR" smtClean="0"/>
+              <a:t>7</a:t>
+            </a:fld>
+            <a:endParaRPr lang="fr-FR"/>
           </a:p>
         </p:txBody>
       </p:sp>
@@ -5895,7 +6025,7 @@
   <a:extraClrSchemeLst/>
   <a:extLst>
     <a:ext uri="{05A4C25C-085E-4340-85A3-A5531E510DB2}">
-      <thm15:themeFamily xmlns:thm15="http://schemas.microsoft.com/office/thememl/2012/main" xmlns="" name="Office Theme" id="{62F939B6-93AF-4DB8-9C6B-D6C7DFDC589F}" vid="{4A3C46E8-61CC-4603-A589-7422A47A8E4A}"/>
+      <thm15:themeFamily xmlns="" xmlns:thm15="http://schemas.microsoft.com/office/thememl/2012/main" name="Office Theme" id="{62F939B6-93AF-4DB8-9C6B-D6C7DFDC589F}" vid="{4A3C46E8-61CC-4603-A589-7422A47A8E4A}"/>
     </a:ext>
   </a:extLst>
 </a:theme>

</xml_diff>